<commit_message>
Update "more info" link
</commit_message>
<xml_diff>
--- a/2024/NECSA_October_2024/02_Tuesday_October_8th/05_McStas_samples/B_More_samples.pptx
+++ b/2024/NECSA_October_2024/02_Tuesday_October_8th/05_McStas_samples/B_More_samples.pptx
@@ -13137,8 +13137,8 @@
         </p:nvSpPr>
         <p:spPr>
           <a:xfrm>
-            <a:off x="1993683" y="1023010"/>
-            <a:ext cx="9312375" cy="4545579"/>
+            <a:off x="1993683" y="1023011"/>
+            <a:ext cx="9312375" cy="4545578"/>
           </a:xfrm>
           <a:prstGeom prst="rect">
             <a:avLst/>

</xml_diff>